<commit_message>
Oops forgot to push it
removed the slideshow stuff that was broken, also added stuff to the presentation
</commit_message>
<xml_diff>
--- a/Presentation/HTMX.pptx
+++ b/Presentation/HTMX.pptx
@@ -6,7 +6,8 @@
   </p:sldMasterIdLst>
   <p:sldIdLst>
     <p:sldId id="256" r:id="rId2"/>
-    <p:sldId id="257" r:id="rId3"/>
+    <p:sldId id="258" r:id="rId3"/>
+    <p:sldId id="257" r:id="rId4"/>
   </p:sldIdLst>
   <p:sldSz cx="12192000" cy="6858000"/>
   <p:notesSz cx="6858000" cy="9144000"/>
@@ -105,6 +106,11 @@
       </a:defRPr>
     </a:lvl9pPr>
   </p:defaultTextStyle>
+  <p:extLst>
+    <p:ext uri="{EFAFB233-063F-42B5-8137-9DF3F51BA10A}">
+      <p15:sldGuideLst xmlns:p15="http://schemas.microsoft.com/office/powerpoint/2012/main"/>
+    </p:ext>
+  </p:extLst>
 </p:presentation>
 </file>
 
@@ -278,7 +284,7 @@
             <a:fld id="{87DE6118-2437-4B30-8E3C-4D2BE6020583}" type="datetimeFigureOut">
               <a:rPr lang="en-US" dirty="0"/>
               <a:pPr/>
-              <a:t>11/21/23</a:t>
+              <a:t>11/27/2023</a:t>
             </a:fld>
             <a:endParaRPr lang="en-US" dirty="0"/>
           </a:p>
@@ -604,7 +610,7 @@
           <a:p>
             <a:fld id="{87DE6118-2437-4B30-8E3C-4D2BE6020583}" type="datetimeFigureOut">
               <a:rPr lang="en-US" dirty="0"/>
-              <a:t>11/21/23</a:t>
+              <a:t>11/27/2023</a:t>
             </a:fld>
             <a:endParaRPr lang="en-US" dirty="0"/>
           </a:p>
@@ -779,7 +785,7 @@
           <a:p>
             <a:fld id="{87DE6118-2437-4B30-8E3C-4D2BE6020583}" type="datetimeFigureOut">
               <a:rPr lang="en-US" dirty="0"/>
-              <a:t>11/21/23</a:t>
+              <a:t>11/27/2023</a:t>
             </a:fld>
             <a:endParaRPr lang="en-US" dirty="0"/>
           </a:p>
@@ -944,7 +950,7 @@
           <a:p>
             <a:fld id="{87DE6118-2437-4B30-8E3C-4D2BE6020583}" type="datetimeFigureOut">
               <a:rPr lang="en-US" dirty="0"/>
-              <a:t>11/21/23</a:t>
+              <a:t>11/27/2023</a:t>
             </a:fld>
             <a:endParaRPr lang="en-US" dirty="0"/>
           </a:p>
@@ -1217,7 +1223,7 @@
             <a:fld id="{87DE6118-2437-4B30-8E3C-4D2BE6020583}" type="datetimeFigureOut">
               <a:rPr lang="en-US" dirty="0"/>
               <a:pPr/>
-              <a:t>11/21/23</a:t>
+              <a:t>11/27/2023</a:t>
             </a:fld>
             <a:endParaRPr lang="en-US" dirty="0"/>
           </a:p>
@@ -1607,7 +1613,7 @@
           <a:p>
             <a:fld id="{87DE6118-2437-4B30-8E3C-4D2BE6020583}" type="datetimeFigureOut">
               <a:rPr lang="en-US" dirty="0"/>
-              <a:t>11/21/23</a:t>
+              <a:t>11/27/2023</a:t>
             </a:fld>
             <a:endParaRPr lang="en-US" dirty="0"/>
           </a:p>
@@ -2079,7 +2085,7 @@
           <a:p>
             <a:fld id="{87DE6118-2437-4B30-8E3C-4D2BE6020583}" type="datetimeFigureOut">
               <a:rPr lang="en-US" dirty="0"/>
-              <a:t>11/21/23</a:t>
+              <a:t>11/27/2023</a:t>
             </a:fld>
             <a:endParaRPr lang="en-US" dirty="0"/>
           </a:p>
@@ -2192,7 +2198,7 @@
           <a:p>
             <a:fld id="{87DE6118-2437-4B30-8E3C-4D2BE6020583}" type="datetimeFigureOut">
               <a:rPr lang="en-US" dirty="0"/>
-              <a:t>11/21/23</a:t>
+              <a:t>11/27/2023</a:t>
             </a:fld>
             <a:endParaRPr lang="en-US" dirty="0"/>
           </a:p>
@@ -2282,7 +2288,7 @@
           <a:p>
             <a:fld id="{87DE6118-2437-4B30-8E3C-4D2BE6020583}" type="datetimeFigureOut">
               <a:rPr lang="en-US" dirty="0"/>
-              <a:t>11/21/23</a:t>
+              <a:t>11/27/2023</a:t>
             </a:fld>
             <a:endParaRPr lang="en-US" dirty="0"/>
           </a:p>
@@ -2624,7 +2630,7 @@
             <a:fld id="{87DE6118-2437-4B30-8E3C-4D2BE6020583}" type="datetimeFigureOut">
               <a:rPr lang="en-US" dirty="0"/>
               <a:pPr/>
-              <a:t>11/21/23</a:t>
+              <a:t>11/27/2023</a:t>
             </a:fld>
             <a:endParaRPr lang="en-US" dirty="0"/>
           </a:p>
@@ -3009,7 +3015,7 @@
             <a:fld id="{87DE6118-2437-4B30-8E3C-4D2BE6020583}" type="datetimeFigureOut">
               <a:rPr lang="en-US" dirty="0"/>
               <a:pPr/>
-              <a:t>11/21/23</a:t>
+              <a:t>11/27/2023</a:t>
             </a:fld>
             <a:endParaRPr lang="en-US" dirty="0"/>
           </a:p>
@@ -3284,7 +3290,7 @@
             <a:fld id="{87DE6118-2437-4B30-8E3C-4D2BE6020583}" type="datetimeFigureOut">
               <a:rPr lang="en-US" dirty="0"/>
               <a:pPr/>
-              <a:t>11/21/23</a:t>
+              <a:t>11/27/2023</a:t>
             </a:fld>
             <a:endParaRPr lang="en-US" dirty="0"/>
           </a:p>
@@ -3888,6 +3894,166 @@
           <p:cNvPr id="2" name="Title 1">
             <a:extLst>
               <a:ext uri="{FF2B5EF4-FFF2-40B4-BE49-F238E27FC236}">
+                <a16:creationId xmlns:a16="http://schemas.microsoft.com/office/drawing/2014/main" id="{0369453D-8F28-0616-C30E-5C1D990BEEB6}"/>
+              </a:ext>
+            </a:extLst>
+          </p:cNvPr>
+          <p:cNvSpPr>
+            <a:spLocks noGrp="1"/>
+          </p:cNvSpPr>
+          <p:nvPr>
+            <p:ph type="title"/>
+          </p:nvPr>
+        </p:nvSpPr>
+        <p:spPr/>
+        <p:txBody>
+          <a:bodyPr/>
+          <a:lstStyle/>
+          <a:p>
+            <a:r>
+              <a:rPr lang="en-US" dirty="0"/>
+              <a:t>HTMX w/ Python</a:t>
+            </a:r>
+          </a:p>
+        </p:txBody>
+      </p:sp>
+      <p:sp>
+        <p:nvSpPr>
+          <p:cNvPr id="3" name="Content Placeholder 2">
+            <a:extLst>
+              <a:ext uri="{FF2B5EF4-FFF2-40B4-BE49-F238E27FC236}">
+                <a16:creationId xmlns:a16="http://schemas.microsoft.com/office/drawing/2014/main" id="{995CD7BD-B56D-D29A-B43D-67D27BF00E16}"/>
+              </a:ext>
+            </a:extLst>
+          </p:cNvPr>
+          <p:cNvSpPr>
+            <a:spLocks noGrp="1"/>
+          </p:cNvSpPr>
+          <p:nvPr>
+            <p:ph idx="1"/>
+          </p:nvPr>
+        </p:nvSpPr>
+        <p:spPr>
+          <a:xfrm>
+            <a:off x="1371600" y="1793289"/>
+            <a:ext cx="9601200" cy="4074111"/>
+          </a:xfrm>
+        </p:spPr>
+        <p:txBody>
+          <a:bodyPr/>
+          <a:lstStyle/>
+          <a:p>
+            <a:r>
+              <a:rPr lang="en-US" dirty="0"/>
+              <a:t>Our framework of choice is Flask Python Backend, with HTMX frontend.</a:t>
+            </a:r>
+          </a:p>
+          <a:p>
+            <a:r>
+              <a:rPr lang="en-US" dirty="0"/>
+              <a:t>How do I use HTMX with Python? (to answer the question nobody asked)</a:t>
+            </a:r>
+          </a:p>
+          <a:p>
+            <a:endParaRPr lang="en-US" dirty="0"/>
+          </a:p>
+        </p:txBody>
+      </p:sp>
+      <p:pic>
+        <p:nvPicPr>
+          <p:cNvPr id="5" name="Picture 4">
+            <a:extLst>
+              <a:ext uri="{FF2B5EF4-FFF2-40B4-BE49-F238E27FC236}">
+                <a16:creationId xmlns:a16="http://schemas.microsoft.com/office/drawing/2014/main" id="{A3951650-7A0E-EA83-368C-FE6AA245759E}"/>
+              </a:ext>
+            </a:extLst>
+          </p:cNvPr>
+          <p:cNvPicPr>
+            <a:picLocks noChangeAspect="1"/>
+          </p:cNvPicPr>
+          <p:nvPr/>
+        </p:nvPicPr>
+        <p:blipFill>
+          <a:blip r:embed="rId2"/>
+          <a:stretch>
+            <a:fillRect/>
+          </a:stretch>
+        </p:blipFill>
+        <p:spPr>
+          <a:xfrm>
+            <a:off x="1371600" y="2811294"/>
+            <a:ext cx="10139256" cy="1635603"/>
+          </a:xfrm>
+          <a:prstGeom prst="rect">
+            <a:avLst/>
+          </a:prstGeom>
+        </p:spPr>
+      </p:pic>
+      <p:pic>
+        <p:nvPicPr>
+          <p:cNvPr id="7" name="Picture 6">
+            <a:extLst>
+              <a:ext uri="{FF2B5EF4-FFF2-40B4-BE49-F238E27FC236}">
+                <a16:creationId xmlns:a16="http://schemas.microsoft.com/office/drawing/2014/main" id="{914C501B-D949-9591-3E0D-F3EF9E2F87C2}"/>
+              </a:ext>
+            </a:extLst>
+          </p:cNvPr>
+          <p:cNvPicPr>
+            <a:picLocks noChangeAspect="1"/>
+          </p:cNvPicPr>
+          <p:nvPr/>
+        </p:nvPicPr>
+        <p:blipFill>
+          <a:blip r:embed="rId3"/>
+          <a:stretch>
+            <a:fillRect/>
+          </a:stretch>
+        </p:blipFill>
+        <p:spPr>
+          <a:xfrm>
+            <a:off x="1358630" y="4804241"/>
+            <a:ext cx="10165052" cy="1485900"/>
+          </a:xfrm>
+          <a:prstGeom prst="rect">
+            <a:avLst/>
+          </a:prstGeom>
+        </p:spPr>
+      </p:pic>
+    </p:spTree>
+    <p:extLst>
+      <p:ext uri="{BB962C8B-B14F-4D97-AF65-F5344CB8AC3E}">
+        <p14:creationId xmlns:p14="http://schemas.microsoft.com/office/powerpoint/2010/main" val="2277626487"/>
+      </p:ext>
+    </p:extLst>
+  </p:cSld>
+  <p:clrMapOvr>
+    <a:masterClrMapping/>
+  </p:clrMapOvr>
+</p:sld>
+</file>
+
+<file path=ppt/slides/slide3.xml><?xml version="1.0" encoding="utf-8"?>
+<p:sld xmlns:a="http://schemas.openxmlformats.org/drawingml/2006/main" xmlns:r="http://schemas.openxmlformats.org/officeDocument/2006/relationships" xmlns:p="http://schemas.openxmlformats.org/presentationml/2006/main">
+  <p:cSld>
+    <p:spTree>
+      <p:nvGrpSpPr>
+        <p:cNvPr id="1" name=""/>
+        <p:cNvGrpSpPr/>
+        <p:nvPr/>
+      </p:nvGrpSpPr>
+      <p:grpSpPr>
+        <a:xfrm>
+          <a:off x="0" y="0"/>
+          <a:ext cx="0" cy="0"/>
+          <a:chOff x="0" y="0"/>
+          <a:chExt cx="0" cy="0"/>
+        </a:xfrm>
+      </p:grpSpPr>
+      <p:sp>
+        <p:nvSpPr>
+          <p:cNvPr id="2" name="Title 1">
+            <a:extLst>
+              <a:ext uri="{FF2B5EF4-FFF2-40B4-BE49-F238E27FC236}">
                 <a16:creationId xmlns:a16="http://schemas.microsoft.com/office/drawing/2014/main" id="{7632B33C-B925-6637-B89B-D5AF599AF3CD}"/>
               </a:ext>
             </a:extLst>

</xml_diff>

<commit_message>
added styling to tabs and pptx
</commit_message>
<xml_diff>
--- a/Presentation/HTMX.pptx
+++ b/Presentation/HTMX.pptx
@@ -8,7 +8,8 @@
     <p:sldId id="256" r:id="rId2"/>
     <p:sldId id="259" r:id="rId3"/>
     <p:sldId id="258" r:id="rId4"/>
-    <p:sldId id="257" r:id="rId5"/>
+    <p:sldId id="260" r:id="rId5"/>
+    <p:sldId id="257" r:id="rId6"/>
   </p:sldIdLst>
   <p:sldSz cx="12192000" cy="6858000"/>
   <p:notesSz cx="6858000" cy="9144000"/>
@@ -285,7 +286,7 @@
             <a:fld id="{87DE6118-2437-4B30-8E3C-4D2BE6020583}" type="datetimeFigureOut">
               <a:rPr lang="en-US" dirty="0"/>
               <a:pPr/>
-              <a:t>12/1/2023</a:t>
+              <a:t>12/7/2023</a:t>
             </a:fld>
             <a:endParaRPr lang="en-US" dirty="0"/>
           </a:p>
@@ -611,7 +612,7 @@
           <a:p>
             <a:fld id="{87DE6118-2437-4B30-8E3C-4D2BE6020583}" type="datetimeFigureOut">
               <a:rPr lang="en-US" dirty="0"/>
-              <a:t>12/1/2023</a:t>
+              <a:t>12/7/2023</a:t>
             </a:fld>
             <a:endParaRPr lang="en-US" dirty="0"/>
           </a:p>
@@ -786,7 +787,7 @@
           <a:p>
             <a:fld id="{87DE6118-2437-4B30-8E3C-4D2BE6020583}" type="datetimeFigureOut">
               <a:rPr lang="en-US" dirty="0"/>
-              <a:t>12/1/2023</a:t>
+              <a:t>12/7/2023</a:t>
             </a:fld>
             <a:endParaRPr lang="en-US" dirty="0"/>
           </a:p>
@@ -951,7 +952,7 @@
           <a:p>
             <a:fld id="{87DE6118-2437-4B30-8E3C-4D2BE6020583}" type="datetimeFigureOut">
               <a:rPr lang="en-US" dirty="0"/>
-              <a:t>12/1/2023</a:t>
+              <a:t>12/7/2023</a:t>
             </a:fld>
             <a:endParaRPr lang="en-US" dirty="0"/>
           </a:p>
@@ -1224,7 +1225,7 @@
             <a:fld id="{87DE6118-2437-4B30-8E3C-4D2BE6020583}" type="datetimeFigureOut">
               <a:rPr lang="en-US" dirty="0"/>
               <a:pPr/>
-              <a:t>12/1/2023</a:t>
+              <a:t>12/7/2023</a:t>
             </a:fld>
             <a:endParaRPr lang="en-US" dirty="0"/>
           </a:p>
@@ -1614,7 +1615,7 @@
           <a:p>
             <a:fld id="{87DE6118-2437-4B30-8E3C-4D2BE6020583}" type="datetimeFigureOut">
               <a:rPr lang="en-US" dirty="0"/>
-              <a:t>12/1/2023</a:t>
+              <a:t>12/7/2023</a:t>
             </a:fld>
             <a:endParaRPr lang="en-US" dirty="0"/>
           </a:p>
@@ -2086,7 +2087,7 @@
           <a:p>
             <a:fld id="{87DE6118-2437-4B30-8E3C-4D2BE6020583}" type="datetimeFigureOut">
               <a:rPr lang="en-US" dirty="0"/>
-              <a:t>12/1/2023</a:t>
+              <a:t>12/7/2023</a:t>
             </a:fld>
             <a:endParaRPr lang="en-US" dirty="0"/>
           </a:p>
@@ -2199,7 +2200,7 @@
           <a:p>
             <a:fld id="{87DE6118-2437-4B30-8E3C-4D2BE6020583}" type="datetimeFigureOut">
               <a:rPr lang="en-US" dirty="0"/>
-              <a:t>12/1/2023</a:t>
+              <a:t>12/7/2023</a:t>
             </a:fld>
             <a:endParaRPr lang="en-US" dirty="0"/>
           </a:p>
@@ -2289,7 +2290,7 @@
           <a:p>
             <a:fld id="{87DE6118-2437-4B30-8E3C-4D2BE6020583}" type="datetimeFigureOut">
               <a:rPr lang="en-US" dirty="0"/>
-              <a:t>12/1/2023</a:t>
+              <a:t>12/7/2023</a:t>
             </a:fld>
             <a:endParaRPr lang="en-US" dirty="0"/>
           </a:p>
@@ -2631,7 +2632,7 @@
             <a:fld id="{87DE6118-2437-4B30-8E3C-4D2BE6020583}" type="datetimeFigureOut">
               <a:rPr lang="en-US" dirty="0"/>
               <a:pPr/>
-              <a:t>12/1/2023</a:t>
+              <a:t>12/7/2023</a:t>
             </a:fld>
             <a:endParaRPr lang="en-US" dirty="0"/>
           </a:p>
@@ -3016,7 +3017,7 @@
             <a:fld id="{87DE6118-2437-4B30-8E3C-4D2BE6020583}" type="datetimeFigureOut">
               <a:rPr lang="en-US" dirty="0"/>
               <a:pPr/>
-              <a:t>12/1/2023</a:t>
+              <a:t>12/7/2023</a:t>
             </a:fld>
             <a:endParaRPr lang="en-US" dirty="0"/>
           </a:p>
@@ -3291,7 +3292,7 @@
             <a:fld id="{87DE6118-2437-4B30-8E3C-4D2BE6020583}" type="datetimeFigureOut">
               <a:rPr lang="en-US" dirty="0"/>
               <a:pPr/>
-              <a:t>12/1/2023</a:t>
+              <a:t>12/7/2023</a:t>
             </a:fld>
             <a:endParaRPr lang="en-US" dirty="0"/>
           </a:p>
@@ -4277,7 +4278,7 @@
           <a:p>
             <a:r>
               <a:rPr lang="en-US" dirty="0"/>
-              <a:t>Our framework of choice is Flask Python Backend, with HTMX frontend.</a:t>
+              <a:t>Our framework of choice is Flask Python Backend, with HTMX.</a:t>
             </a:r>
           </a:p>
           <a:p>
@@ -4365,6 +4366,139 @@
 </file>
 
 <file path=ppt/slides/slide4.xml><?xml version="1.0" encoding="utf-8"?>
+<p:sld xmlns:a="http://schemas.openxmlformats.org/drawingml/2006/main" xmlns:r="http://schemas.openxmlformats.org/officeDocument/2006/relationships" xmlns:p="http://schemas.openxmlformats.org/presentationml/2006/main">
+  <p:cSld>
+    <p:spTree>
+      <p:nvGrpSpPr>
+        <p:cNvPr id="1" name=""/>
+        <p:cNvGrpSpPr/>
+        <p:nvPr/>
+      </p:nvGrpSpPr>
+      <p:grpSpPr>
+        <a:xfrm>
+          <a:off x="0" y="0"/>
+          <a:ext cx="0" cy="0"/>
+          <a:chOff x="0" y="0"/>
+          <a:chExt cx="0" cy="0"/>
+        </a:xfrm>
+      </p:grpSpPr>
+      <p:sp>
+        <p:nvSpPr>
+          <p:cNvPr id="2" name="Title 1">
+            <a:extLst>
+              <a:ext uri="{FF2B5EF4-FFF2-40B4-BE49-F238E27FC236}">
+                <a16:creationId xmlns:a16="http://schemas.microsoft.com/office/drawing/2014/main" id="{DA22467A-AC60-10E4-3A72-F640161BABDB}"/>
+              </a:ext>
+            </a:extLst>
+          </p:cNvPr>
+          <p:cNvSpPr>
+            <a:spLocks noGrp="1"/>
+          </p:cNvSpPr>
+          <p:nvPr>
+            <p:ph type="title"/>
+          </p:nvPr>
+        </p:nvSpPr>
+        <p:spPr/>
+        <p:txBody>
+          <a:bodyPr/>
+          <a:lstStyle/>
+          <a:p>
+            <a:r>
+              <a:rPr lang="en-US" dirty="0"/>
+              <a:t>Tabs</a:t>
+            </a:r>
+          </a:p>
+        </p:txBody>
+      </p:sp>
+      <p:sp>
+        <p:nvSpPr>
+          <p:cNvPr id="3" name="Content Placeholder 2">
+            <a:extLst>
+              <a:ext uri="{FF2B5EF4-FFF2-40B4-BE49-F238E27FC236}">
+                <a16:creationId xmlns:a16="http://schemas.microsoft.com/office/drawing/2014/main" id="{602CCD82-19DA-FC51-1389-4F5DA7FE05A2}"/>
+              </a:ext>
+            </a:extLst>
+          </p:cNvPr>
+          <p:cNvSpPr>
+            <a:spLocks noGrp="1"/>
+          </p:cNvSpPr>
+          <p:nvPr>
+            <p:ph idx="1"/>
+          </p:nvPr>
+        </p:nvSpPr>
+        <p:spPr>
+          <a:xfrm>
+            <a:off x="1371600" y="1466850"/>
+            <a:ext cx="9601200" cy="3581400"/>
+          </a:xfrm>
+        </p:spPr>
+        <p:txBody>
+          <a:bodyPr/>
+          <a:lstStyle/>
+          <a:p>
+            <a:r>
+              <a:rPr lang="en-US" dirty="0"/>
+              <a:t>Used to change page content without reloading webpage.</a:t>
+            </a:r>
+          </a:p>
+          <a:p>
+            <a:r>
+              <a:rPr lang="en-US" dirty="0"/>
+              <a:t>HTMX handles the get request</a:t>
+            </a:r>
+          </a:p>
+          <a:p>
+            <a:r>
+              <a:rPr lang="en-US" dirty="0"/>
+              <a:t>Flask loads content </a:t>
+            </a:r>
+          </a:p>
+        </p:txBody>
+      </p:sp>
+      <p:pic>
+        <p:nvPicPr>
+          <p:cNvPr id="7" name="Picture 6">
+            <a:extLst>
+              <a:ext uri="{FF2B5EF4-FFF2-40B4-BE49-F238E27FC236}">
+                <a16:creationId xmlns:a16="http://schemas.microsoft.com/office/drawing/2014/main" id="{9961C5C3-3527-EC23-C418-D2082ED5CC72}"/>
+              </a:ext>
+            </a:extLst>
+          </p:cNvPr>
+          <p:cNvPicPr>
+            <a:picLocks noChangeAspect="1"/>
+          </p:cNvPicPr>
+          <p:nvPr/>
+        </p:nvPicPr>
+        <p:blipFill>
+          <a:blip r:embed="rId2"/>
+          <a:stretch>
+            <a:fillRect/>
+          </a:stretch>
+        </p:blipFill>
+        <p:spPr>
+          <a:xfrm>
+            <a:off x="943583" y="3067232"/>
+            <a:ext cx="9283430" cy="3314518"/>
+          </a:xfrm>
+          <a:prstGeom prst="rect">
+            <a:avLst/>
+          </a:prstGeom>
+        </p:spPr>
+      </p:pic>
+    </p:spTree>
+    <p:extLst>
+      <p:ext uri="{BB962C8B-B14F-4D97-AF65-F5344CB8AC3E}">
+        <p14:creationId xmlns:p14="http://schemas.microsoft.com/office/powerpoint/2010/main" val="3213340087"/>
+      </p:ext>
+    </p:extLst>
+  </p:cSld>
+  <p:clrMapOvr>
+    <a:masterClrMapping/>
+  </p:clrMapOvr>
+</p:sld>
+</file>
+
+<file path=ppt/slides/slide5.xml><?xml version="1.0" encoding="utf-8"?>
 <p:sld xmlns:a="http://schemas.openxmlformats.org/drawingml/2006/main" xmlns:r="http://schemas.openxmlformats.org/officeDocument/2006/relationships" xmlns:p="http://schemas.openxmlformats.org/presentationml/2006/main">
   <p:cSld>
     <p:spTree>

</xml_diff>